<commit_message>
Premier commit : Ajout du projet Angular 17
</commit_message>
<xml_diff>
--- a/RAPPORT DU PROJET IONIC.pptx
+++ b/RAPPORT DU PROJET IONIC.pptx
@@ -7,13 +7,24 @@
   <p:sldIdLst>
     <p:sldId id="256" r:id="rId2"/>
     <p:sldId id="258" r:id="rId3"/>
-    <p:sldId id="259" r:id="rId4"/>
-    <p:sldId id="260" r:id="rId5"/>
+    <p:sldId id="260" r:id="rId4"/>
+    <p:sldId id="259" r:id="rId5"/>
     <p:sldId id="261" r:id="rId6"/>
     <p:sldId id="262" r:id="rId7"/>
     <p:sldId id="263" r:id="rId8"/>
     <p:sldId id="264" r:id="rId9"/>
     <p:sldId id="265" r:id="rId10"/>
+    <p:sldId id="266" r:id="rId11"/>
+    <p:sldId id="267" r:id="rId12"/>
+    <p:sldId id="268" r:id="rId13"/>
+    <p:sldId id="269" r:id="rId14"/>
+    <p:sldId id="270" r:id="rId15"/>
+    <p:sldId id="271" r:id="rId16"/>
+    <p:sldId id="274" r:id="rId17"/>
+    <p:sldId id="272" r:id="rId18"/>
+    <p:sldId id="275" r:id="rId19"/>
+    <p:sldId id="273" r:id="rId20"/>
+    <p:sldId id="276" r:id="rId21"/>
   </p:sldIdLst>
   <p:sldSz cx="12192000" cy="6858000"/>
   <p:notesSz cx="6858000" cy="9144000"/>
@@ -306,7 +317,7 @@
           <a:p>
             <a:fld id="{0B25C456-1FDF-44FB-9F35-E9F1273C9516}" type="datetimeFigureOut">
               <a:rPr lang="fr-FR" smtClean="0"/>
-              <a:t>22/02/2024</a:t>
+              <a:t>28/02/2024</a:t>
             </a:fld>
             <a:endParaRPr lang="fr-FR" dirty="0"/>
           </a:p>
@@ -581,7 +592,7 @@
           <a:p>
             <a:fld id="{0B25C456-1FDF-44FB-9F35-E9F1273C9516}" type="datetimeFigureOut">
               <a:rPr lang="fr-FR" smtClean="0"/>
-              <a:t>22/02/2024</a:t>
+              <a:t>28/02/2024</a:t>
             </a:fld>
             <a:endParaRPr lang="fr-FR" dirty="0"/>
           </a:p>
@@ -775,7 +786,7 @@
           <a:p>
             <a:fld id="{0B25C456-1FDF-44FB-9F35-E9F1273C9516}" type="datetimeFigureOut">
               <a:rPr lang="fr-FR" smtClean="0"/>
-              <a:t>22/02/2024</a:t>
+              <a:t>28/02/2024</a:t>
             </a:fld>
             <a:endParaRPr lang="fr-FR" dirty="0"/>
           </a:p>
@@ -1046,7 +1057,7 @@
           <a:p>
             <a:fld id="{0B25C456-1FDF-44FB-9F35-E9F1273C9516}" type="datetimeFigureOut">
               <a:rPr lang="fr-FR" smtClean="0"/>
-              <a:t>22/02/2024</a:t>
+              <a:t>28/02/2024</a:t>
             </a:fld>
             <a:endParaRPr lang="fr-FR" dirty="0"/>
           </a:p>
@@ -1373,7 +1384,7 @@
           <a:p>
             <a:fld id="{0B25C456-1FDF-44FB-9F35-E9F1273C9516}" type="datetimeFigureOut">
               <a:rPr lang="fr-FR" smtClean="0"/>
-              <a:t>22/02/2024</a:t>
+              <a:t>28/02/2024</a:t>
             </a:fld>
             <a:endParaRPr lang="fr-FR" dirty="0"/>
           </a:p>
@@ -1992,7 +2003,7 @@
           <a:p>
             <a:fld id="{0B25C456-1FDF-44FB-9F35-E9F1273C9516}" type="datetimeFigureOut">
               <a:rPr lang="fr-FR" smtClean="0"/>
-              <a:t>22/02/2024</a:t>
+              <a:t>28/02/2024</a:t>
             </a:fld>
             <a:endParaRPr lang="fr-FR" dirty="0"/>
           </a:p>
@@ -2839,7 +2850,7 @@
           <a:p>
             <a:fld id="{0B25C456-1FDF-44FB-9F35-E9F1273C9516}" type="datetimeFigureOut">
               <a:rPr lang="fr-FR" smtClean="0"/>
-              <a:t>22/02/2024</a:t>
+              <a:t>28/02/2024</a:t>
             </a:fld>
             <a:endParaRPr lang="fr-FR" dirty="0"/>
           </a:p>
@@ -3009,7 +3020,7 @@
           <a:p>
             <a:fld id="{0B25C456-1FDF-44FB-9F35-E9F1273C9516}" type="datetimeFigureOut">
               <a:rPr lang="fr-FR" smtClean="0"/>
-              <a:t>22/02/2024</a:t>
+              <a:t>28/02/2024</a:t>
             </a:fld>
             <a:endParaRPr lang="fr-FR" dirty="0"/>
           </a:p>
@@ -3189,7 +3200,7 @@
           <a:p>
             <a:fld id="{0B25C456-1FDF-44FB-9F35-E9F1273C9516}" type="datetimeFigureOut">
               <a:rPr lang="fr-FR" smtClean="0"/>
-              <a:t>22/02/2024</a:t>
+              <a:t>28/02/2024</a:t>
             </a:fld>
             <a:endParaRPr lang="fr-FR" dirty="0"/>
           </a:p>
@@ -3359,7 +3370,7 @@
           <a:p>
             <a:fld id="{0B25C456-1FDF-44FB-9F35-E9F1273C9516}" type="datetimeFigureOut">
               <a:rPr lang="fr-FR" smtClean="0"/>
-              <a:t>22/02/2024</a:t>
+              <a:t>28/02/2024</a:t>
             </a:fld>
             <a:endParaRPr lang="fr-FR" dirty="0"/>
           </a:p>
@@ -3606,7 +3617,7 @@
           <a:p>
             <a:fld id="{0B25C456-1FDF-44FB-9F35-E9F1273C9516}" type="datetimeFigureOut">
               <a:rPr lang="fr-FR" smtClean="0"/>
-              <a:t>22/02/2024</a:t>
+              <a:t>28/02/2024</a:t>
             </a:fld>
             <a:endParaRPr lang="fr-FR" dirty="0"/>
           </a:p>
@@ -3898,7 +3909,7 @@
           <a:p>
             <a:fld id="{0B25C456-1FDF-44FB-9F35-E9F1273C9516}" type="datetimeFigureOut">
               <a:rPr lang="fr-FR" smtClean="0"/>
-              <a:t>22/02/2024</a:t>
+              <a:t>28/02/2024</a:t>
             </a:fld>
             <a:endParaRPr lang="fr-FR" dirty="0"/>
           </a:p>
@@ -4342,7 +4353,7 @@
           <a:p>
             <a:fld id="{0B25C456-1FDF-44FB-9F35-E9F1273C9516}" type="datetimeFigureOut">
               <a:rPr lang="fr-FR" smtClean="0"/>
-              <a:t>22/02/2024</a:t>
+              <a:t>28/02/2024</a:t>
             </a:fld>
             <a:endParaRPr lang="fr-FR" dirty="0"/>
           </a:p>
@@ -4460,7 +4471,7 @@
           <a:p>
             <a:fld id="{0B25C456-1FDF-44FB-9F35-E9F1273C9516}" type="datetimeFigureOut">
               <a:rPr lang="fr-FR" smtClean="0"/>
-              <a:t>22/02/2024</a:t>
+              <a:t>28/02/2024</a:t>
             </a:fld>
             <a:endParaRPr lang="fr-FR" dirty="0"/>
           </a:p>
@@ -4555,7 +4566,7 @@
           <a:p>
             <a:fld id="{0B25C456-1FDF-44FB-9F35-E9F1273C9516}" type="datetimeFigureOut">
               <a:rPr lang="fr-FR" smtClean="0"/>
-              <a:t>22/02/2024</a:t>
+              <a:t>28/02/2024</a:t>
             </a:fld>
             <a:endParaRPr lang="fr-FR" dirty="0"/>
           </a:p>
@@ -4834,7 +4845,7 @@
           <a:p>
             <a:fld id="{0B25C456-1FDF-44FB-9F35-E9F1273C9516}" type="datetimeFigureOut">
               <a:rPr lang="fr-FR" smtClean="0"/>
-              <a:t>22/02/2024</a:t>
+              <a:t>28/02/2024</a:t>
             </a:fld>
             <a:endParaRPr lang="fr-FR" dirty="0"/>
           </a:p>
@@ -5109,7 +5120,7 @@
           <a:p>
             <a:fld id="{0B25C456-1FDF-44FB-9F35-E9F1273C9516}" type="datetimeFigureOut">
               <a:rPr lang="fr-FR" smtClean="0"/>
-              <a:t>22/02/2024</a:t>
+              <a:t>28/02/2024</a:t>
             </a:fld>
             <a:endParaRPr lang="fr-FR" dirty="0"/>
           </a:p>
@@ -5532,7 +5543,7 @@
           <a:p>
             <a:fld id="{0B25C456-1FDF-44FB-9F35-E9F1273C9516}" type="datetimeFigureOut">
               <a:rPr lang="fr-FR" smtClean="0"/>
-              <a:t>22/02/2024</a:t>
+              <a:t>28/02/2024</a:t>
             </a:fld>
             <a:endParaRPr lang="fr-FR" dirty="0"/>
           </a:p>
@@ -6401,21 +6412,7 @@
                 <a:latin typeface="Times New Roman" panose="02020603050405020304" pitchFamily="18" charset="0"/>
                 <a:cs typeface="Times New Roman" panose="02020603050405020304" pitchFamily="18" charset="0"/>
               </a:rPr>
-              <a:t>Réalisée </a:t>
-            </a:r>
-            <a:r>
-              <a:rPr lang="fr-FR" sz="2000" b="1" dirty="0" smtClean="0">
-                <a:latin typeface="Times New Roman" panose="02020603050405020304" pitchFamily="18" charset="0"/>
-                <a:cs typeface="Times New Roman" panose="02020603050405020304" pitchFamily="18" charset="0"/>
-              </a:rPr>
-              <a:t>par </a:t>
-            </a:r>
-            <a:r>
-              <a:rPr lang="fr-FR" sz="2000" b="1" dirty="0" smtClean="0">
-                <a:latin typeface="Times New Roman" panose="02020603050405020304" pitchFamily="18" charset="0"/>
-                <a:cs typeface="Times New Roman" panose="02020603050405020304" pitchFamily="18" charset="0"/>
-              </a:rPr>
-              <a:t>: </a:t>
+              <a:t>Réalisée par : </a:t>
             </a:r>
             <a:br>
               <a:rPr lang="fr-FR" sz="2000" b="1" dirty="0" smtClean="0">
@@ -6428,14 +6425,7 @@
                 <a:latin typeface="Times New Roman" panose="02020603050405020304" pitchFamily="18" charset="0"/>
                 <a:cs typeface="Times New Roman" panose="02020603050405020304" pitchFamily="18" charset="0"/>
               </a:rPr>
-              <a:t>Malado</a:t>
-            </a:r>
-            <a:r>
-              <a:rPr lang="fr-FR" sz="2000" b="1" dirty="0" smtClean="0">
-                <a:latin typeface="Times New Roman" panose="02020603050405020304" pitchFamily="18" charset="0"/>
-                <a:cs typeface="Times New Roman" panose="02020603050405020304" pitchFamily="18" charset="0"/>
-              </a:rPr>
-              <a:t> NGOM </a:t>
+              <a:t>Malado NGOM </a:t>
             </a:r>
             <a:br>
               <a:rPr lang="fr-FR" sz="2000" b="1" dirty="0" smtClean="0">
@@ -6533,6 +6523,1018 @@
 </p:sld>
 </file>
 
+<file path=ppt/slides/slide10.xml><?xml version="1.0" encoding="utf-8"?>
+<p:sld xmlns:a="http://schemas.openxmlformats.org/drawingml/2006/main" xmlns:r="http://schemas.openxmlformats.org/officeDocument/2006/relationships" xmlns:p="http://schemas.openxmlformats.org/presentationml/2006/main">
+  <p:cSld>
+    <p:spTree>
+      <p:nvGrpSpPr>
+        <p:cNvPr id="1" name=""/>
+        <p:cNvGrpSpPr/>
+        <p:nvPr/>
+      </p:nvGrpSpPr>
+      <p:grpSpPr>
+        <a:xfrm>
+          <a:off x="0" y="0"/>
+          <a:ext cx="0" cy="0"/>
+          <a:chOff x="0" y="0"/>
+          <a:chExt cx="0" cy="0"/>
+        </a:xfrm>
+      </p:grpSpPr>
+      <p:sp>
+        <p:nvSpPr>
+          <p:cNvPr id="2" name="Titre 1"/>
+          <p:cNvSpPr>
+            <a:spLocks noGrp="1"/>
+          </p:cNvSpPr>
+          <p:nvPr>
+            <p:ph type="title"/>
+          </p:nvPr>
+        </p:nvSpPr>
+        <p:spPr>
+          <a:xfrm>
+            <a:off x="646111" y="452718"/>
+            <a:ext cx="9404723" cy="654865"/>
+          </a:xfrm>
+        </p:spPr>
+        <p:txBody>
+          <a:bodyPr/>
+          <a:lstStyle/>
+          <a:p>
+            <a:pPr algn="ctr"/>
+            <a:r>
+              <a:rPr lang="fr-FR" dirty="0" smtClean="0"/>
+              <a:t/>
+            </a:r>
+            <a:br>
+              <a:rPr lang="fr-FR" dirty="0" smtClean="0"/>
+            </a:br>
+            <a:r>
+              <a:rPr lang="fr-FR" dirty="0" err="1" smtClean="0"/>
+              <a:t>tabs-routing.module.ts</a:t>
+            </a:r>
+            <a:endParaRPr lang="fr-FR" dirty="0"/>
+          </a:p>
+        </p:txBody>
+      </p:sp>
+      <p:pic>
+        <p:nvPicPr>
+          <p:cNvPr id="8" name="Espace réservé du contenu 7"/>
+          <p:cNvPicPr>
+            <a:picLocks noGrp="1" noChangeAspect="1"/>
+          </p:cNvPicPr>
+          <p:nvPr>
+            <p:ph idx="1"/>
+          </p:nvPr>
+        </p:nvPicPr>
+        <p:blipFill>
+          <a:blip r:embed="rId2">
+            <a:extLst>
+              <a:ext uri="{28A0092B-C50C-407E-A947-70E740481C1C}">
+                <a14:useLocalDpi xmlns:a14="http://schemas.microsoft.com/office/drawing/2010/main" val="0"/>
+              </a:ext>
+            </a:extLst>
+          </a:blip>
+          <a:stretch>
+            <a:fillRect/>
+          </a:stretch>
+        </p:blipFill>
+        <p:spPr>
+          <a:xfrm>
+            <a:off x="1805868" y="2052638"/>
+            <a:ext cx="7542039" cy="4195762"/>
+          </a:xfrm>
+        </p:spPr>
+      </p:pic>
+    </p:spTree>
+    <p:extLst>
+      <p:ext uri="{BB962C8B-B14F-4D97-AF65-F5344CB8AC3E}">
+        <p14:creationId xmlns:p14="http://schemas.microsoft.com/office/powerpoint/2010/main" val="1835760892"/>
+      </p:ext>
+    </p:extLst>
+  </p:cSld>
+  <p:clrMapOvr>
+    <a:masterClrMapping/>
+  </p:clrMapOvr>
+</p:sld>
+</file>
+
+<file path=ppt/slides/slide11.xml><?xml version="1.0" encoding="utf-8"?>
+<p:sld xmlns:a="http://schemas.openxmlformats.org/drawingml/2006/main" xmlns:r="http://schemas.openxmlformats.org/officeDocument/2006/relationships" xmlns:p="http://schemas.openxmlformats.org/presentationml/2006/main">
+  <p:cSld>
+    <p:spTree>
+      <p:nvGrpSpPr>
+        <p:cNvPr id="1" name=""/>
+        <p:cNvGrpSpPr/>
+        <p:nvPr/>
+      </p:nvGrpSpPr>
+      <p:grpSpPr>
+        <a:xfrm>
+          <a:off x="0" y="0"/>
+          <a:ext cx="0" cy="0"/>
+          <a:chOff x="0" y="0"/>
+          <a:chExt cx="0" cy="0"/>
+        </a:xfrm>
+      </p:grpSpPr>
+      <p:sp>
+        <p:nvSpPr>
+          <p:cNvPr id="2" name="Titre 1"/>
+          <p:cNvSpPr>
+            <a:spLocks noGrp="1"/>
+          </p:cNvSpPr>
+          <p:nvPr>
+            <p:ph type="title"/>
+          </p:nvPr>
+        </p:nvSpPr>
+        <p:spPr>
+          <a:xfrm>
+            <a:off x="646111" y="452718"/>
+            <a:ext cx="9404723" cy="616228"/>
+          </a:xfrm>
+        </p:spPr>
+        <p:txBody>
+          <a:bodyPr/>
+          <a:lstStyle/>
+          <a:p>
+            <a:r>
+              <a:rPr lang="fr-FR" dirty="0" smtClean="0"/>
+              <a:t/>
+            </a:r>
+            <a:br>
+              <a:rPr lang="fr-FR" dirty="0" smtClean="0"/>
+            </a:br>
+            <a:r>
+              <a:rPr lang="fr-FR" dirty="0" smtClean="0"/>
+              <a:t>                          </a:t>
+            </a:r>
+            <a:r>
+              <a:rPr lang="fr-FR" sz="2400" dirty="0" err="1" smtClean="0"/>
+              <a:t>book.service.ts</a:t>
+            </a:r>
+            <a:endParaRPr lang="fr-FR" dirty="0"/>
+          </a:p>
+        </p:txBody>
+      </p:sp>
+      <p:pic>
+        <p:nvPicPr>
+          <p:cNvPr id="4" name="Espace réservé du contenu 3"/>
+          <p:cNvPicPr>
+            <a:picLocks noGrp="1" noChangeAspect="1"/>
+          </p:cNvPicPr>
+          <p:nvPr>
+            <p:ph idx="1"/>
+          </p:nvPr>
+        </p:nvPicPr>
+        <p:blipFill>
+          <a:blip r:embed="rId2">
+            <a:extLst>
+              <a:ext uri="{28A0092B-C50C-407E-A947-70E740481C1C}">
+                <a14:useLocalDpi xmlns:a14="http://schemas.microsoft.com/office/drawing/2010/main" val="0"/>
+              </a:ext>
+            </a:extLst>
+          </a:blip>
+          <a:stretch>
+            <a:fillRect/>
+          </a:stretch>
+        </p:blipFill>
+        <p:spPr>
+          <a:xfrm>
+            <a:off x="1796634" y="2052638"/>
+            <a:ext cx="7560507" cy="4195762"/>
+          </a:xfrm>
+        </p:spPr>
+      </p:pic>
+    </p:spTree>
+    <p:extLst>
+      <p:ext uri="{BB962C8B-B14F-4D97-AF65-F5344CB8AC3E}">
+        <p14:creationId xmlns:p14="http://schemas.microsoft.com/office/powerpoint/2010/main" val="233603712"/>
+      </p:ext>
+    </p:extLst>
+  </p:cSld>
+  <p:clrMapOvr>
+    <a:masterClrMapping/>
+  </p:clrMapOvr>
+</p:sld>
+</file>
+
+<file path=ppt/slides/slide12.xml><?xml version="1.0" encoding="utf-8"?>
+<p:sld xmlns:a="http://schemas.openxmlformats.org/drawingml/2006/main" xmlns:r="http://schemas.openxmlformats.org/officeDocument/2006/relationships" xmlns:p="http://schemas.openxmlformats.org/presentationml/2006/main">
+  <p:cSld>
+    <p:spTree>
+      <p:nvGrpSpPr>
+        <p:cNvPr id="1" name=""/>
+        <p:cNvGrpSpPr/>
+        <p:nvPr/>
+      </p:nvGrpSpPr>
+      <p:grpSpPr>
+        <a:xfrm>
+          <a:off x="0" y="0"/>
+          <a:ext cx="0" cy="0"/>
+          <a:chOff x="0" y="0"/>
+          <a:chExt cx="0" cy="0"/>
+        </a:xfrm>
+      </p:grpSpPr>
+      <p:sp>
+        <p:nvSpPr>
+          <p:cNvPr id="2" name="Titre 1"/>
+          <p:cNvSpPr>
+            <a:spLocks noGrp="1"/>
+          </p:cNvSpPr>
+          <p:nvPr>
+            <p:ph type="title"/>
+          </p:nvPr>
+        </p:nvSpPr>
+        <p:spPr>
+          <a:xfrm>
+            <a:off x="646111" y="452718"/>
+            <a:ext cx="9404723" cy="680623"/>
+          </a:xfrm>
+        </p:spPr>
+        <p:txBody>
+          <a:bodyPr/>
+          <a:lstStyle/>
+          <a:p>
+            <a:r>
+              <a:rPr lang="fr-FR" dirty="0" smtClean="0"/>
+              <a:t/>
+            </a:r>
+            <a:br>
+              <a:rPr lang="fr-FR" dirty="0" smtClean="0"/>
+            </a:br>
+            <a:r>
+              <a:rPr lang="fr-FR" dirty="0"/>
+              <a:t> </a:t>
+            </a:r>
+            <a:r>
+              <a:rPr lang="fr-FR" dirty="0" smtClean="0"/>
+              <a:t>                   </a:t>
+            </a:r>
+            <a:r>
+              <a:rPr lang="fr-FR" sz="2400" dirty="0" err="1" smtClean="0"/>
+              <a:t>book.service.spec.ts</a:t>
+            </a:r>
+            <a:r>
+              <a:rPr lang="fr-FR" sz="2400" dirty="0" smtClean="0"/>
+              <a:t/>
+            </a:r>
+            <a:br>
+              <a:rPr lang="fr-FR" sz="2400" dirty="0" smtClean="0"/>
+            </a:br>
+            <a:endParaRPr lang="fr-FR" dirty="0"/>
+          </a:p>
+        </p:txBody>
+      </p:sp>
+      <p:pic>
+        <p:nvPicPr>
+          <p:cNvPr id="4" name="Espace réservé du contenu 3"/>
+          <p:cNvPicPr>
+            <a:picLocks noGrp="1" noChangeAspect="1"/>
+          </p:cNvPicPr>
+          <p:nvPr>
+            <p:ph idx="1"/>
+          </p:nvPr>
+        </p:nvPicPr>
+        <p:blipFill>
+          <a:blip r:embed="rId2">
+            <a:extLst>
+              <a:ext uri="{28A0092B-C50C-407E-A947-70E740481C1C}">
+                <a14:useLocalDpi xmlns:a14="http://schemas.microsoft.com/office/drawing/2010/main" val="0"/>
+              </a:ext>
+            </a:extLst>
+          </a:blip>
+          <a:stretch>
+            <a:fillRect/>
+          </a:stretch>
+        </p:blipFill>
+        <p:spPr>
+          <a:xfrm>
+            <a:off x="1785120" y="2052638"/>
+            <a:ext cx="7583536" cy="4195762"/>
+          </a:xfrm>
+        </p:spPr>
+      </p:pic>
+    </p:spTree>
+    <p:extLst>
+      <p:ext uri="{BB962C8B-B14F-4D97-AF65-F5344CB8AC3E}">
+        <p14:creationId xmlns:p14="http://schemas.microsoft.com/office/powerpoint/2010/main" val="3469436087"/>
+      </p:ext>
+    </p:extLst>
+  </p:cSld>
+  <p:clrMapOvr>
+    <a:masterClrMapping/>
+  </p:clrMapOvr>
+</p:sld>
+</file>
+
+<file path=ppt/slides/slide13.xml><?xml version="1.0" encoding="utf-8"?>
+<p:sld xmlns:a="http://schemas.openxmlformats.org/drawingml/2006/main" xmlns:r="http://schemas.openxmlformats.org/officeDocument/2006/relationships" xmlns:p="http://schemas.openxmlformats.org/presentationml/2006/main">
+  <p:cSld>
+    <p:spTree>
+      <p:nvGrpSpPr>
+        <p:cNvPr id="1" name=""/>
+        <p:cNvGrpSpPr/>
+        <p:nvPr/>
+      </p:nvGrpSpPr>
+      <p:grpSpPr>
+        <a:xfrm>
+          <a:off x="0" y="0"/>
+          <a:ext cx="0" cy="0"/>
+          <a:chOff x="0" y="0"/>
+          <a:chExt cx="0" cy="0"/>
+        </a:xfrm>
+      </p:grpSpPr>
+      <p:sp>
+        <p:nvSpPr>
+          <p:cNvPr id="2" name="Titre 1"/>
+          <p:cNvSpPr>
+            <a:spLocks noGrp="1"/>
+          </p:cNvSpPr>
+          <p:nvPr>
+            <p:ph type="title"/>
+          </p:nvPr>
+        </p:nvSpPr>
+        <p:spPr>
+          <a:xfrm>
+            <a:off x="646111" y="452718"/>
+            <a:ext cx="9404723" cy="719259"/>
+          </a:xfrm>
+        </p:spPr>
+        <p:txBody>
+          <a:bodyPr/>
+          <a:lstStyle/>
+          <a:p>
+            <a:r>
+              <a:rPr lang="fr-FR" dirty="0" smtClean="0"/>
+              <a:t/>
+            </a:r>
+            <a:br>
+              <a:rPr lang="fr-FR" dirty="0" smtClean="0"/>
+            </a:br>
+            <a:r>
+              <a:rPr lang="fr-FR" dirty="0" smtClean="0"/>
+              <a:t>                   </a:t>
+            </a:r>
+            <a:r>
+              <a:rPr lang="fr-FR" sz="2400" dirty="0" smtClean="0"/>
+              <a:t>création donnée </a:t>
+            </a:r>
+            <a:r>
+              <a:rPr lang="fr-FR" sz="2400" dirty="0" err="1" smtClean="0"/>
+              <a:t>json</a:t>
+            </a:r>
+            <a:endParaRPr lang="fr-FR" dirty="0"/>
+          </a:p>
+        </p:txBody>
+      </p:sp>
+      <p:pic>
+        <p:nvPicPr>
+          <p:cNvPr id="4" name="Espace réservé du contenu 3"/>
+          <p:cNvPicPr>
+            <a:picLocks noGrp="1" noChangeAspect="1"/>
+          </p:cNvPicPr>
+          <p:nvPr>
+            <p:ph idx="1"/>
+          </p:nvPr>
+        </p:nvPicPr>
+        <p:blipFill>
+          <a:blip r:embed="rId2">
+            <a:extLst>
+              <a:ext uri="{28A0092B-C50C-407E-A947-70E740481C1C}">
+                <a14:useLocalDpi xmlns:a14="http://schemas.microsoft.com/office/drawing/2010/main" val="0"/>
+              </a:ext>
+            </a:extLst>
+          </a:blip>
+          <a:stretch>
+            <a:fillRect/>
+          </a:stretch>
+        </p:blipFill>
+        <p:spPr>
+          <a:xfrm>
+            <a:off x="1825519" y="2052638"/>
+            <a:ext cx="7502737" cy="4195762"/>
+          </a:xfrm>
+        </p:spPr>
+      </p:pic>
+    </p:spTree>
+    <p:extLst>
+      <p:ext uri="{BB962C8B-B14F-4D97-AF65-F5344CB8AC3E}">
+        <p14:creationId xmlns:p14="http://schemas.microsoft.com/office/powerpoint/2010/main" val="1602922361"/>
+      </p:ext>
+    </p:extLst>
+  </p:cSld>
+  <p:clrMapOvr>
+    <a:masterClrMapping/>
+  </p:clrMapOvr>
+</p:sld>
+</file>
+
+<file path=ppt/slides/slide14.xml><?xml version="1.0" encoding="utf-8"?>
+<p:sld xmlns:a="http://schemas.openxmlformats.org/drawingml/2006/main" xmlns:r="http://schemas.openxmlformats.org/officeDocument/2006/relationships" xmlns:p="http://schemas.openxmlformats.org/presentationml/2006/main">
+  <p:cSld>
+    <p:spTree>
+      <p:nvGrpSpPr>
+        <p:cNvPr id="1" name=""/>
+        <p:cNvGrpSpPr/>
+        <p:nvPr/>
+      </p:nvGrpSpPr>
+      <p:grpSpPr>
+        <a:xfrm>
+          <a:off x="0" y="0"/>
+          <a:ext cx="0" cy="0"/>
+          <a:chOff x="0" y="0"/>
+          <a:chExt cx="0" cy="0"/>
+        </a:xfrm>
+      </p:grpSpPr>
+      <p:sp>
+        <p:nvSpPr>
+          <p:cNvPr id="2" name="Titre 1"/>
+          <p:cNvSpPr>
+            <a:spLocks noGrp="1"/>
+          </p:cNvSpPr>
+          <p:nvPr>
+            <p:ph type="title"/>
+          </p:nvPr>
+        </p:nvSpPr>
+        <p:spPr>
+          <a:xfrm>
+            <a:off x="646111" y="452718"/>
+            <a:ext cx="9404723" cy="706381"/>
+          </a:xfrm>
+        </p:spPr>
+        <p:txBody>
+          <a:bodyPr/>
+          <a:lstStyle/>
+          <a:p>
+            <a:r>
+              <a:rPr lang="fr-FR" dirty="0" smtClean="0"/>
+              <a:t/>
+            </a:r>
+            <a:br>
+              <a:rPr lang="fr-FR" dirty="0" smtClean="0"/>
+            </a:br>
+            <a:r>
+              <a:rPr lang="fr-FR" dirty="0"/>
+              <a:t> </a:t>
+            </a:r>
+            <a:r>
+              <a:rPr lang="fr-FR" dirty="0" smtClean="0"/>
+              <a:t>                </a:t>
+            </a:r>
+            <a:r>
+              <a:rPr lang="fr-FR" sz="2400" dirty="0" smtClean="0"/>
+              <a:t>tab1.page.html</a:t>
+            </a:r>
+            <a:endParaRPr lang="fr-FR" dirty="0"/>
+          </a:p>
+        </p:txBody>
+      </p:sp>
+      <p:pic>
+        <p:nvPicPr>
+          <p:cNvPr id="4" name="Espace réservé du contenu 3"/>
+          <p:cNvPicPr>
+            <a:picLocks noGrp="1" noChangeAspect="1"/>
+          </p:cNvPicPr>
+          <p:nvPr>
+            <p:ph idx="1"/>
+          </p:nvPr>
+        </p:nvPicPr>
+        <p:blipFill>
+          <a:blip r:embed="rId2">
+            <a:extLst>
+              <a:ext uri="{28A0092B-C50C-407E-A947-70E740481C1C}">
+                <a14:useLocalDpi xmlns:a14="http://schemas.microsoft.com/office/drawing/2010/main" val="0"/>
+              </a:ext>
+            </a:extLst>
+          </a:blip>
+          <a:stretch>
+            <a:fillRect/>
+          </a:stretch>
+        </p:blipFill>
+        <p:spPr>
+          <a:xfrm>
+            <a:off x="1798400" y="2052638"/>
+            <a:ext cx="7556976" cy="4195762"/>
+          </a:xfrm>
+        </p:spPr>
+      </p:pic>
+    </p:spTree>
+    <p:extLst>
+      <p:ext uri="{BB962C8B-B14F-4D97-AF65-F5344CB8AC3E}">
+        <p14:creationId xmlns:p14="http://schemas.microsoft.com/office/powerpoint/2010/main" val="855448244"/>
+      </p:ext>
+    </p:extLst>
+  </p:cSld>
+  <p:clrMapOvr>
+    <a:masterClrMapping/>
+  </p:clrMapOvr>
+</p:sld>
+</file>
+
+<file path=ppt/slides/slide15.xml><?xml version="1.0" encoding="utf-8"?>
+<p:sld xmlns:a="http://schemas.openxmlformats.org/drawingml/2006/main" xmlns:r="http://schemas.openxmlformats.org/officeDocument/2006/relationships" xmlns:p="http://schemas.openxmlformats.org/presentationml/2006/main">
+  <p:cSld>
+    <p:spTree>
+      <p:nvGrpSpPr>
+        <p:cNvPr id="1" name=""/>
+        <p:cNvGrpSpPr/>
+        <p:nvPr/>
+      </p:nvGrpSpPr>
+      <p:grpSpPr>
+        <a:xfrm>
+          <a:off x="0" y="0"/>
+          <a:ext cx="0" cy="0"/>
+          <a:chOff x="0" y="0"/>
+          <a:chExt cx="0" cy="0"/>
+        </a:xfrm>
+      </p:grpSpPr>
+      <p:sp>
+        <p:nvSpPr>
+          <p:cNvPr id="2" name="Titre 1"/>
+          <p:cNvSpPr>
+            <a:spLocks noGrp="1"/>
+          </p:cNvSpPr>
+          <p:nvPr>
+            <p:ph type="title"/>
+          </p:nvPr>
+        </p:nvSpPr>
+        <p:spPr>
+          <a:xfrm>
+            <a:off x="646111" y="452718"/>
+            <a:ext cx="9404723" cy="848048"/>
+          </a:xfrm>
+        </p:spPr>
+        <p:txBody>
+          <a:bodyPr/>
+          <a:lstStyle/>
+          <a:p>
+            <a:r>
+              <a:rPr lang="fr-FR" dirty="0" smtClean="0"/>
+              <a:t/>
+            </a:r>
+            <a:br>
+              <a:rPr lang="fr-FR" dirty="0" smtClean="0"/>
+            </a:br>
+            <a:r>
+              <a:rPr lang="fr-FR" dirty="0"/>
+              <a:t> </a:t>
+            </a:r>
+            <a:r>
+              <a:rPr lang="fr-FR" dirty="0" smtClean="0"/>
+              <a:t>                     </a:t>
+            </a:r>
+            <a:r>
+              <a:rPr lang="fr-FR" sz="4400" dirty="0" smtClean="0"/>
+              <a:t>tab1.page.scss</a:t>
+            </a:r>
+            <a:endParaRPr lang="fr-FR" dirty="0"/>
+          </a:p>
+        </p:txBody>
+      </p:sp>
+      <p:pic>
+        <p:nvPicPr>
+          <p:cNvPr id="4" name="Espace réservé du contenu 3"/>
+          <p:cNvPicPr>
+            <a:picLocks noGrp="1" noChangeAspect="1"/>
+          </p:cNvPicPr>
+          <p:nvPr>
+            <p:ph idx="1"/>
+          </p:nvPr>
+        </p:nvPicPr>
+        <p:blipFill>
+          <a:blip r:embed="rId2">
+            <a:extLst>
+              <a:ext uri="{28A0092B-C50C-407E-A947-70E740481C1C}">
+                <a14:useLocalDpi xmlns:a14="http://schemas.microsoft.com/office/drawing/2010/main" val="0"/>
+              </a:ext>
+            </a:extLst>
+          </a:blip>
+          <a:stretch>
+            <a:fillRect/>
+          </a:stretch>
+        </p:blipFill>
+        <p:spPr>
+          <a:xfrm>
+            <a:off x="1779897" y="2052638"/>
+            <a:ext cx="7593982" cy="4195762"/>
+          </a:xfrm>
+        </p:spPr>
+      </p:pic>
+    </p:spTree>
+    <p:extLst>
+      <p:ext uri="{BB962C8B-B14F-4D97-AF65-F5344CB8AC3E}">
+        <p14:creationId xmlns:p14="http://schemas.microsoft.com/office/powerpoint/2010/main" val="2527924282"/>
+      </p:ext>
+    </p:extLst>
+  </p:cSld>
+  <p:clrMapOvr>
+    <a:masterClrMapping/>
+  </p:clrMapOvr>
+</p:sld>
+</file>
+
+<file path=ppt/slides/slide16.xml><?xml version="1.0" encoding="utf-8"?>
+<p:sld xmlns:a="http://schemas.openxmlformats.org/drawingml/2006/main" xmlns:r="http://schemas.openxmlformats.org/officeDocument/2006/relationships" xmlns:p="http://schemas.openxmlformats.org/presentationml/2006/main">
+  <p:cSld>
+    <p:spTree>
+      <p:nvGrpSpPr>
+        <p:cNvPr id="1" name=""/>
+        <p:cNvGrpSpPr/>
+        <p:nvPr/>
+      </p:nvGrpSpPr>
+      <p:grpSpPr>
+        <a:xfrm>
+          <a:off x="0" y="0"/>
+          <a:ext cx="0" cy="0"/>
+          <a:chOff x="0" y="0"/>
+          <a:chExt cx="0" cy="0"/>
+        </a:xfrm>
+      </p:grpSpPr>
+      <p:sp>
+        <p:nvSpPr>
+          <p:cNvPr id="2" name="Titre 1"/>
+          <p:cNvSpPr>
+            <a:spLocks noGrp="1"/>
+          </p:cNvSpPr>
+          <p:nvPr>
+            <p:ph type="title"/>
+          </p:nvPr>
+        </p:nvSpPr>
+        <p:spPr>
+          <a:xfrm>
+            <a:off x="646111" y="452718"/>
+            <a:ext cx="9404723" cy="912443"/>
+          </a:xfrm>
+        </p:spPr>
+        <p:txBody>
+          <a:bodyPr/>
+          <a:lstStyle/>
+          <a:p>
+            <a:r>
+              <a:rPr lang="fr-FR" dirty="0" smtClean="0"/>
+              <a:t/>
+            </a:r>
+            <a:br>
+              <a:rPr lang="fr-FR" dirty="0" smtClean="0"/>
+            </a:br>
+            <a:r>
+              <a:rPr lang="fr-FR" dirty="0" smtClean="0"/>
+              <a:t>                 </a:t>
+            </a:r>
+            <a:r>
+              <a:rPr lang="fr-FR" sz="4000" dirty="0" smtClean="0"/>
+              <a:t>tab2.page.html</a:t>
+            </a:r>
+            <a:endParaRPr lang="fr-FR" dirty="0"/>
+          </a:p>
+        </p:txBody>
+      </p:sp>
+      <p:pic>
+        <p:nvPicPr>
+          <p:cNvPr id="4" name="Espace réservé du contenu 3"/>
+          <p:cNvPicPr>
+            <a:picLocks noGrp="1" noChangeAspect="1"/>
+          </p:cNvPicPr>
+          <p:nvPr>
+            <p:ph idx="1"/>
+          </p:nvPr>
+        </p:nvPicPr>
+        <p:blipFill>
+          <a:blip r:embed="rId2">
+            <a:extLst>
+              <a:ext uri="{28A0092B-C50C-407E-A947-70E740481C1C}">
+                <a14:useLocalDpi xmlns:a14="http://schemas.microsoft.com/office/drawing/2010/main" val="0"/>
+              </a:ext>
+            </a:extLst>
+          </a:blip>
+          <a:stretch>
+            <a:fillRect/>
+          </a:stretch>
+        </p:blipFill>
+        <p:spPr>
+          <a:xfrm>
+            <a:off x="1793210" y="2052638"/>
+            <a:ext cx="7567356" cy="4195762"/>
+          </a:xfrm>
+        </p:spPr>
+      </p:pic>
+    </p:spTree>
+    <p:extLst>
+      <p:ext uri="{BB962C8B-B14F-4D97-AF65-F5344CB8AC3E}">
+        <p14:creationId xmlns:p14="http://schemas.microsoft.com/office/powerpoint/2010/main" val="3842651875"/>
+      </p:ext>
+    </p:extLst>
+  </p:cSld>
+  <p:clrMapOvr>
+    <a:masterClrMapping/>
+  </p:clrMapOvr>
+</p:sld>
+</file>
+
+<file path=ppt/slides/slide17.xml><?xml version="1.0" encoding="utf-8"?>
+<p:sld xmlns:a="http://schemas.openxmlformats.org/drawingml/2006/main" xmlns:r="http://schemas.openxmlformats.org/officeDocument/2006/relationships" xmlns:p="http://schemas.openxmlformats.org/presentationml/2006/main">
+  <p:cSld>
+    <p:spTree>
+      <p:nvGrpSpPr>
+        <p:cNvPr id="1" name=""/>
+        <p:cNvGrpSpPr/>
+        <p:nvPr/>
+      </p:nvGrpSpPr>
+      <p:grpSpPr>
+        <a:xfrm>
+          <a:off x="0" y="0"/>
+          <a:ext cx="0" cy="0"/>
+          <a:chOff x="0" y="0"/>
+          <a:chExt cx="0" cy="0"/>
+        </a:xfrm>
+      </p:grpSpPr>
+      <p:sp>
+        <p:nvSpPr>
+          <p:cNvPr id="2" name="Titre 1"/>
+          <p:cNvSpPr>
+            <a:spLocks noGrp="1"/>
+          </p:cNvSpPr>
+          <p:nvPr>
+            <p:ph type="title"/>
+          </p:nvPr>
+        </p:nvSpPr>
+        <p:spPr>
+          <a:xfrm>
+            <a:off x="646111" y="452718"/>
+            <a:ext cx="9404723" cy="822290"/>
+          </a:xfrm>
+        </p:spPr>
+        <p:txBody>
+          <a:bodyPr/>
+          <a:lstStyle/>
+          <a:p>
+            <a:r>
+              <a:rPr lang="fr-FR" dirty="0" smtClean="0"/>
+              <a:t/>
+            </a:r>
+            <a:br>
+              <a:rPr lang="fr-FR" dirty="0" smtClean="0"/>
+            </a:br>
+            <a:r>
+              <a:rPr lang="fr-FR" dirty="0"/>
+              <a:t> </a:t>
+            </a:r>
+            <a:r>
+              <a:rPr lang="fr-FR" dirty="0" smtClean="0"/>
+              <a:t>                 </a:t>
+            </a:r>
+            <a:r>
+              <a:rPr lang="fr-FR" sz="4000" dirty="0" smtClean="0"/>
+              <a:t>tab2.page.scss</a:t>
+            </a:r>
+            <a:endParaRPr lang="fr-FR" dirty="0"/>
+          </a:p>
+        </p:txBody>
+      </p:sp>
+      <p:pic>
+        <p:nvPicPr>
+          <p:cNvPr id="4" name="Espace réservé du contenu 3"/>
+          <p:cNvPicPr>
+            <a:picLocks noGrp="1" noChangeAspect="1"/>
+          </p:cNvPicPr>
+          <p:nvPr>
+            <p:ph idx="1"/>
+          </p:nvPr>
+        </p:nvPicPr>
+        <p:blipFill>
+          <a:blip r:embed="rId2">
+            <a:extLst>
+              <a:ext uri="{28A0092B-C50C-407E-A947-70E740481C1C}">
+                <a14:useLocalDpi xmlns:a14="http://schemas.microsoft.com/office/drawing/2010/main" val="0"/>
+              </a:ext>
+            </a:extLst>
+          </a:blip>
+          <a:stretch>
+            <a:fillRect/>
+          </a:stretch>
+        </p:blipFill>
+        <p:spPr>
+          <a:xfrm>
+            <a:off x="1801278" y="2052638"/>
+            <a:ext cx="7551220" cy="4195762"/>
+          </a:xfrm>
+        </p:spPr>
+      </p:pic>
+    </p:spTree>
+    <p:extLst>
+      <p:ext uri="{BB962C8B-B14F-4D97-AF65-F5344CB8AC3E}">
+        <p14:creationId xmlns:p14="http://schemas.microsoft.com/office/powerpoint/2010/main" val="3115553966"/>
+      </p:ext>
+    </p:extLst>
+  </p:cSld>
+  <p:clrMapOvr>
+    <a:masterClrMapping/>
+  </p:clrMapOvr>
+</p:sld>
+</file>
+
+<file path=ppt/slides/slide18.xml><?xml version="1.0" encoding="utf-8"?>
+<p:sld xmlns:a="http://schemas.openxmlformats.org/drawingml/2006/main" xmlns:r="http://schemas.openxmlformats.org/officeDocument/2006/relationships" xmlns:p="http://schemas.openxmlformats.org/presentationml/2006/main">
+  <p:cSld>
+    <p:spTree>
+      <p:nvGrpSpPr>
+        <p:cNvPr id="1" name=""/>
+        <p:cNvGrpSpPr/>
+        <p:nvPr/>
+      </p:nvGrpSpPr>
+      <p:grpSpPr>
+        <a:xfrm>
+          <a:off x="0" y="0"/>
+          <a:ext cx="0" cy="0"/>
+          <a:chOff x="0" y="0"/>
+          <a:chExt cx="0" cy="0"/>
+        </a:xfrm>
+      </p:grpSpPr>
+      <p:sp>
+        <p:nvSpPr>
+          <p:cNvPr id="2" name="Titre 1"/>
+          <p:cNvSpPr>
+            <a:spLocks noGrp="1"/>
+          </p:cNvSpPr>
+          <p:nvPr>
+            <p:ph type="title"/>
+          </p:nvPr>
+        </p:nvSpPr>
+        <p:spPr>
+          <a:xfrm>
+            <a:off x="646111" y="452718"/>
+            <a:ext cx="9404723" cy="706381"/>
+          </a:xfrm>
+        </p:spPr>
+        <p:txBody>
+          <a:bodyPr/>
+          <a:lstStyle/>
+          <a:p>
+            <a:r>
+              <a:rPr lang="fr-FR" dirty="0" smtClean="0"/>
+              <a:t/>
+            </a:r>
+            <a:br>
+              <a:rPr lang="fr-FR" dirty="0" smtClean="0"/>
+            </a:br>
+            <a:r>
+              <a:rPr lang="fr-FR" dirty="0"/>
+              <a:t> </a:t>
+            </a:r>
+            <a:r>
+              <a:rPr lang="fr-FR" dirty="0" smtClean="0"/>
+              <a:t>                   </a:t>
+            </a:r>
+            <a:r>
+              <a:rPr lang="fr-FR" sz="4000" dirty="0" smtClean="0"/>
+              <a:t>tab3.page.html</a:t>
+            </a:r>
+            <a:endParaRPr lang="fr-FR" dirty="0"/>
+          </a:p>
+        </p:txBody>
+      </p:sp>
+      <p:pic>
+        <p:nvPicPr>
+          <p:cNvPr id="4" name="Espace réservé du contenu 3"/>
+          <p:cNvPicPr>
+            <a:picLocks noGrp="1" noChangeAspect="1"/>
+          </p:cNvPicPr>
+          <p:nvPr>
+            <p:ph idx="1"/>
+          </p:nvPr>
+        </p:nvPicPr>
+        <p:blipFill>
+          <a:blip r:embed="rId2">
+            <a:extLst>
+              <a:ext uri="{28A0092B-C50C-407E-A947-70E740481C1C}">
+                <a14:useLocalDpi xmlns:a14="http://schemas.microsoft.com/office/drawing/2010/main" val="0"/>
+              </a:ext>
+            </a:extLst>
+          </a:blip>
+          <a:stretch>
+            <a:fillRect/>
+          </a:stretch>
+        </p:blipFill>
+        <p:spPr>
+          <a:xfrm>
+            <a:off x="1775919" y="2052638"/>
+            <a:ext cx="7601937" cy="4195762"/>
+          </a:xfrm>
+        </p:spPr>
+      </p:pic>
+    </p:spTree>
+    <p:extLst>
+      <p:ext uri="{BB962C8B-B14F-4D97-AF65-F5344CB8AC3E}">
+        <p14:creationId xmlns:p14="http://schemas.microsoft.com/office/powerpoint/2010/main" val="3453147981"/>
+      </p:ext>
+    </p:extLst>
+  </p:cSld>
+  <p:clrMapOvr>
+    <a:masterClrMapping/>
+  </p:clrMapOvr>
+</p:sld>
+</file>
+
+<file path=ppt/slides/slide19.xml><?xml version="1.0" encoding="utf-8"?>
+<p:sld xmlns:a="http://schemas.openxmlformats.org/drawingml/2006/main" xmlns:r="http://schemas.openxmlformats.org/officeDocument/2006/relationships" xmlns:p="http://schemas.openxmlformats.org/presentationml/2006/main">
+  <p:cSld>
+    <p:spTree>
+      <p:nvGrpSpPr>
+        <p:cNvPr id="1" name=""/>
+        <p:cNvGrpSpPr/>
+        <p:nvPr/>
+      </p:nvGrpSpPr>
+      <p:grpSpPr>
+        <a:xfrm>
+          <a:off x="0" y="0"/>
+          <a:ext cx="0" cy="0"/>
+          <a:chOff x="0" y="0"/>
+          <a:chExt cx="0" cy="0"/>
+        </a:xfrm>
+      </p:grpSpPr>
+      <p:sp>
+        <p:nvSpPr>
+          <p:cNvPr id="2" name="Titre 1"/>
+          <p:cNvSpPr>
+            <a:spLocks noGrp="1"/>
+          </p:cNvSpPr>
+          <p:nvPr>
+            <p:ph type="title"/>
+          </p:nvPr>
+        </p:nvSpPr>
+        <p:spPr>
+          <a:xfrm>
+            <a:off x="646111" y="452718"/>
+            <a:ext cx="9404723" cy="757896"/>
+          </a:xfrm>
+        </p:spPr>
+        <p:txBody>
+          <a:bodyPr/>
+          <a:lstStyle/>
+          <a:p>
+            <a:r>
+              <a:rPr lang="fr-FR" dirty="0" smtClean="0"/>
+              <a:t/>
+            </a:r>
+            <a:br>
+              <a:rPr lang="fr-FR" dirty="0" smtClean="0"/>
+            </a:br>
+            <a:r>
+              <a:rPr lang="fr-FR" dirty="0"/>
+              <a:t> </a:t>
+            </a:r>
+            <a:r>
+              <a:rPr lang="fr-FR" dirty="0" smtClean="0"/>
+              <a:t>                 </a:t>
+            </a:r>
+            <a:r>
+              <a:rPr lang="fr-FR" sz="4000" dirty="0" smtClean="0"/>
+              <a:t>tab3.page.scss</a:t>
+            </a:r>
+            <a:endParaRPr lang="fr-FR" dirty="0"/>
+          </a:p>
+        </p:txBody>
+      </p:sp>
+      <p:pic>
+        <p:nvPicPr>
+          <p:cNvPr id="6" name="Espace réservé du contenu 5"/>
+          <p:cNvPicPr>
+            <a:picLocks noGrp="1" noChangeAspect="1"/>
+          </p:cNvPicPr>
+          <p:nvPr>
+            <p:ph idx="1"/>
+          </p:nvPr>
+        </p:nvPicPr>
+        <p:blipFill>
+          <a:blip r:embed="rId2">
+            <a:extLst>
+              <a:ext uri="{28A0092B-C50C-407E-A947-70E740481C1C}">
+                <a14:useLocalDpi xmlns:a14="http://schemas.microsoft.com/office/drawing/2010/main" val="0"/>
+              </a:ext>
+            </a:extLst>
+          </a:blip>
+          <a:stretch>
+            <a:fillRect/>
+          </a:stretch>
+        </p:blipFill>
+        <p:spPr>
+          <a:xfrm>
+            <a:off x="1796092" y="2052638"/>
+            <a:ext cx="7561592" cy="4195762"/>
+          </a:xfrm>
+        </p:spPr>
+      </p:pic>
+    </p:spTree>
+    <p:extLst>
+      <p:ext uri="{BB962C8B-B14F-4D97-AF65-F5344CB8AC3E}">
+        <p14:creationId xmlns:p14="http://schemas.microsoft.com/office/powerpoint/2010/main" val="1523049013"/>
+      </p:ext>
+    </p:extLst>
+  </p:cSld>
+  <p:clrMapOvr>
+    <a:masterClrMapping/>
+  </p:clrMapOvr>
+</p:sld>
+</file>
+
 <file path=ppt/slides/slide2.xml><?xml version="1.0" encoding="utf-8"?>
 <p:sld xmlns:a="http://schemas.openxmlformats.org/drawingml/2006/main" xmlns:r="http://schemas.openxmlformats.org/officeDocument/2006/relationships" xmlns:p="http://schemas.openxmlformats.org/presentationml/2006/main">
   <p:cSld>
@@ -6636,7 +7638,7 @@
                 <a:latin typeface="Times New Roman" panose="02020603050405020304" pitchFamily="18" charset="0"/>
                 <a:cs typeface="Times New Roman" panose="02020603050405020304" pitchFamily="18" charset="0"/>
               </a:rPr>
-              <a:t>lire </a:t>
+              <a:t>de découvrir </a:t>
             </a:r>
             <a:r>
               <a:rPr lang="fr-FR" sz="4000" dirty="0">
@@ -6685,6 +7687,139 @@
 </p:sld>
 </file>
 
+<file path=ppt/slides/slide20.xml><?xml version="1.0" encoding="utf-8"?>
+<p:sld xmlns:a="http://schemas.openxmlformats.org/drawingml/2006/main" xmlns:r="http://schemas.openxmlformats.org/officeDocument/2006/relationships" xmlns:p="http://schemas.openxmlformats.org/presentationml/2006/main">
+  <p:cSld>
+    <p:spTree>
+      <p:nvGrpSpPr>
+        <p:cNvPr id="1" name=""/>
+        <p:cNvGrpSpPr/>
+        <p:nvPr/>
+      </p:nvGrpSpPr>
+      <p:grpSpPr>
+        <a:xfrm>
+          <a:off x="0" y="0"/>
+          <a:ext cx="0" cy="0"/>
+          <a:chOff x="0" y="0"/>
+          <a:chExt cx="0" cy="0"/>
+        </a:xfrm>
+      </p:grpSpPr>
+      <p:sp>
+        <p:nvSpPr>
+          <p:cNvPr id="2" name="Titre 1"/>
+          <p:cNvSpPr>
+            <a:spLocks noGrp="1"/>
+          </p:cNvSpPr>
+          <p:nvPr>
+            <p:ph type="title"/>
+          </p:nvPr>
+        </p:nvSpPr>
+        <p:spPr/>
+        <p:txBody>
+          <a:bodyPr/>
+          <a:lstStyle/>
+          <a:p>
+            <a:pPr algn="ctr"/>
+            <a:r>
+              <a:rPr lang="fr-FR" dirty="0" smtClean="0"/>
+              <a:t>Conclusion</a:t>
+            </a:r>
+            <a:endParaRPr lang="fr-FR" dirty="0"/>
+          </a:p>
+        </p:txBody>
+      </p:sp>
+      <p:sp>
+        <p:nvSpPr>
+          <p:cNvPr id="3" name="Espace réservé du contenu 2"/>
+          <p:cNvSpPr>
+            <a:spLocks noGrp="1"/>
+          </p:cNvSpPr>
+          <p:nvPr>
+            <p:ph idx="1"/>
+          </p:nvPr>
+        </p:nvSpPr>
+        <p:spPr>
+          <a:xfrm>
+            <a:off x="1103312" y="2052919"/>
+            <a:ext cx="8946541" cy="3072874"/>
+          </a:xfrm>
+        </p:spPr>
+        <p:txBody>
+          <a:bodyPr/>
+          <a:lstStyle/>
+          <a:p>
+            <a:pPr marL="0" indent="0">
+              <a:buNone/>
+            </a:pPr>
+            <a:r>
+              <a:rPr lang="fr-FR" dirty="0"/>
+              <a:t>En </a:t>
+            </a:r>
+            <a:r>
+              <a:rPr lang="fr-FR" dirty="0" smtClean="0"/>
+              <a:t>somme</a:t>
+            </a:r>
+            <a:r>
+              <a:rPr lang="fr-FR" dirty="0"/>
+              <a:t>, </a:t>
+            </a:r>
+            <a:r>
+              <a:rPr lang="fr-FR" dirty="0" smtClean="0"/>
+              <a:t>notre application « </a:t>
+            </a:r>
+            <a:r>
+              <a:rPr lang="fr-FR" dirty="0" err="1" smtClean="0"/>
+              <a:t>AudioLivre</a:t>
+            </a:r>
+            <a:r>
+              <a:rPr lang="fr-FR" dirty="0" smtClean="0"/>
+              <a:t> » offre </a:t>
+            </a:r>
+            <a:r>
+              <a:rPr lang="fr-FR" dirty="0"/>
+              <a:t>une expérience immersive et pratique pour les lecteurs, leur permettant d'apprécier des histoires et des connaissances à tout moment et en tout </a:t>
+            </a:r>
+            <a:r>
+              <a:rPr lang="fr-FR" dirty="0" smtClean="0"/>
+              <a:t>lieu, Facilitant </a:t>
+            </a:r>
+            <a:r>
+              <a:rPr lang="fr-FR" dirty="0"/>
+              <a:t>l'accès à la culture et à l'éducation, et </a:t>
+            </a:r>
+            <a:r>
+              <a:rPr lang="fr-FR" dirty="0" smtClean="0"/>
+              <a:t>rend </a:t>
+            </a:r>
+            <a:r>
+              <a:rPr lang="fr-FR" dirty="0"/>
+              <a:t>la littérature plus accessible et inclusive. </a:t>
+            </a:r>
+            <a:r>
+              <a:rPr lang="fr-FR" dirty="0" smtClean="0"/>
+              <a:t>Ainsi l’application représente une </a:t>
+            </a:r>
+            <a:r>
+              <a:rPr lang="fr-FR" dirty="0"/>
+              <a:t>évolution importante dans la façon dont nous consommons et apprécions les livres, ouvrant de nouvelles opportunités pour la narration et l'apprentissage.</a:t>
+            </a:r>
+            <a:endParaRPr lang="fr-FR" dirty="0"/>
+          </a:p>
+        </p:txBody>
+      </p:sp>
+    </p:spTree>
+    <p:extLst>
+      <p:ext uri="{BB962C8B-B14F-4D97-AF65-F5344CB8AC3E}">
+        <p14:creationId xmlns:p14="http://schemas.microsoft.com/office/powerpoint/2010/main" val="2517951659"/>
+      </p:ext>
+    </p:extLst>
+  </p:cSld>
+  <p:clrMapOvr>
+    <a:masterClrMapping/>
+  </p:clrMapOvr>
+</p:sld>
+</file>
+
 <file path=ppt/slides/slide3.xml><?xml version="1.0" encoding="utf-8"?>
 <p:sld xmlns:a="http://schemas.openxmlformats.org/drawingml/2006/main" xmlns:r="http://schemas.openxmlformats.org/officeDocument/2006/relationships" xmlns:p="http://schemas.openxmlformats.org/presentationml/2006/main">
   <p:cSld>
@@ -6712,156 +7847,200 @@
             <p:ph type="title"/>
           </p:nvPr>
         </p:nvSpPr>
-        <p:spPr>
-          <a:xfrm>
-            <a:off x="646111" y="195140"/>
-            <a:ext cx="9404723" cy="1400530"/>
-          </a:xfrm>
-        </p:spPr>
+        <p:spPr/>
         <p:txBody>
           <a:bodyPr/>
           <a:lstStyle/>
           <a:p>
             <a:pPr algn="ctr"/>
             <a:r>
-              <a:rPr lang="fr-FR" dirty="0"/>
-              <a:t> </a:t>
-            </a:r>
-            <a:r>
-              <a:rPr lang="fr-FR" dirty="0" smtClean="0"/>
-              <a:t> </a:t>
-            </a:r>
-            <a:r>
-              <a:rPr lang="fr-FR" b="1" u="sng" dirty="0" smtClean="0"/>
-              <a:t>Design et Interface utilisateur (UI/UX)</a:t>
-            </a:r>
-            <a:endParaRPr lang="fr-FR" b="1" u="sng" dirty="0"/>
-          </a:p>
-        </p:txBody>
-      </p:sp>
-      <p:pic>
-        <p:nvPicPr>
-          <p:cNvPr id="5" name="Espace réservé du contenu 4"/>
-          <p:cNvPicPr>
-            <a:picLocks noGrp="1" noChangeAspect="1"/>
-          </p:cNvPicPr>
+              <a:rPr lang="fr-FR" b="1" u="sng" dirty="0" smtClean="0">
+                <a:latin typeface="Times New Roman" panose="02020603050405020304" pitchFamily="18" charset="0"/>
+                <a:cs typeface="Times New Roman" panose="02020603050405020304" pitchFamily="18" charset="0"/>
+              </a:rPr>
+              <a:t>Présentation de l’application</a:t>
+            </a:r>
+            <a:endParaRPr lang="fr-FR" b="1" u="sng" dirty="0">
+              <a:latin typeface="Times New Roman" panose="02020603050405020304" pitchFamily="18" charset="0"/>
+              <a:cs typeface="Times New Roman" panose="02020603050405020304" pitchFamily="18" charset="0"/>
+            </a:endParaRPr>
+          </a:p>
+        </p:txBody>
+      </p:sp>
+      <p:sp>
+        <p:nvSpPr>
+          <p:cNvPr id="3" name="Espace réservé du contenu 2"/>
+          <p:cNvSpPr>
+            <a:spLocks noGrp="1"/>
+          </p:cNvSpPr>
           <p:nvPr>
             <p:ph idx="1"/>
           </p:nvPr>
-        </p:nvPicPr>
-        <p:blipFill>
-          <a:blip r:embed="rId2">
-            <a:extLst>
-              <a:ext uri="{28A0092B-C50C-407E-A947-70E740481C1C}">
-                <a14:useLocalDpi xmlns:a14="http://schemas.microsoft.com/office/drawing/2010/main" val="0"/>
-              </a:ext>
-            </a:extLst>
-          </a:blip>
-          <a:stretch>
-            <a:fillRect/>
-          </a:stretch>
-        </p:blipFill>
-        <p:spPr>
-          <a:xfrm>
-            <a:off x="160652" y="1816039"/>
-            <a:ext cx="2543530" cy="4067743"/>
-          </a:xfrm>
-        </p:spPr>
-      </p:pic>
-      <p:pic>
-        <p:nvPicPr>
-          <p:cNvPr id="19" name="Image 18"/>
-          <p:cNvPicPr>
-            <a:picLocks noChangeAspect="1"/>
-          </p:cNvPicPr>
-          <p:nvPr/>
-        </p:nvPicPr>
-        <p:blipFill>
-          <a:blip r:embed="rId3">
-            <a:extLst>
-              <a:ext uri="{28A0092B-C50C-407E-A947-70E740481C1C}">
-                <a14:useLocalDpi xmlns:a14="http://schemas.microsoft.com/office/drawing/2010/main" val="0"/>
-              </a:ext>
-            </a:extLst>
-          </a:blip>
-          <a:stretch>
-            <a:fillRect/>
-          </a:stretch>
-        </p:blipFill>
-        <p:spPr>
-          <a:xfrm>
-            <a:off x="9279566" y="1904587"/>
-            <a:ext cx="2418788" cy="3941986"/>
-          </a:xfrm>
-          <a:prstGeom prst="rect">
-            <a:avLst/>
-          </a:prstGeom>
-        </p:spPr>
-      </p:pic>
-      <p:pic>
-        <p:nvPicPr>
-          <p:cNvPr id="20" name="Image 19"/>
-          <p:cNvPicPr>
-            <a:picLocks noChangeAspect="1"/>
-          </p:cNvPicPr>
-          <p:nvPr/>
-        </p:nvPicPr>
-        <p:blipFill>
-          <a:blip r:embed="rId4">
-            <a:extLst>
-              <a:ext uri="{28A0092B-C50C-407E-A947-70E740481C1C}">
-                <a14:useLocalDpi xmlns:a14="http://schemas.microsoft.com/office/drawing/2010/main" val="0"/>
-              </a:ext>
-            </a:extLst>
-          </a:blip>
-          <a:stretch>
-            <a:fillRect/>
-          </a:stretch>
-        </p:blipFill>
-        <p:spPr>
-          <a:xfrm>
-            <a:off x="6253201" y="1904587"/>
-            <a:ext cx="2555948" cy="3941986"/>
-          </a:xfrm>
-          <a:prstGeom prst="rect">
-            <a:avLst/>
-          </a:prstGeom>
-        </p:spPr>
-      </p:pic>
-      <p:pic>
-        <p:nvPicPr>
-          <p:cNvPr id="21" name="Image 20"/>
-          <p:cNvPicPr>
-            <a:picLocks noChangeAspect="1"/>
-          </p:cNvPicPr>
-          <p:nvPr/>
-        </p:nvPicPr>
-        <p:blipFill>
-          <a:blip r:embed="rId5">
-            <a:extLst>
-              <a:ext uri="{28A0092B-C50C-407E-A947-70E740481C1C}">
-                <a14:useLocalDpi xmlns:a14="http://schemas.microsoft.com/office/drawing/2010/main" val="0"/>
-              </a:ext>
-            </a:extLst>
-          </a:blip>
-          <a:stretch>
-            <a:fillRect/>
-          </a:stretch>
-        </p:blipFill>
-        <p:spPr>
-          <a:xfrm>
-            <a:off x="3174598" y="1890457"/>
-            <a:ext cx="2608186" cy="3956116"/>
-          </a:xfrm>
-          <a:prstGeom prst="rect">
-            <a:avLst/>
-          </a:prstGeom>
-        </p:spPr>
-      </p:pic>
+        </p:nvSpPr>
+        <p:spPr>
+          <a:xfrm>
+            <a:off x="646112" y="1577341"/>
+            <a:ext cx="9860942" cy="4849217"/>
+          </a:xfrm>
+        </p:spPr>
+        <p:txBody>
+          <a:bodyPr>
+            <a:normAutofit fontScale="85000" lnSpcReduction="20000"/>
+          </a:bodyPr>
+          <a:lstStyle/>
+          <a:p>
+            <a:pPr marL="0" indent="0" algn="ctr">
+              <a:buNone/>
+            </a:pPr>
+            <a:r>
+              <a:rPr lang="fr-FR" sz="2800" dirty="0" smtClean="0">
+                <a:latin typeface="Times New Roman" panose="02020603050405020304" pitchFamily="18" charset="0"/>
+                <a:cs typeface="Times New Roman" panose="02020603050405020304" pitchFamily="18" charset="0"/>
+              </a:rPr>
+              <a:t>Notre application peut avoir divers </a:t>
+            </a:r>
+            <a:r>
+              <a:rPr lang="fr-FR" sz="2800" dirty="0">
+                <a:latin typeface="Times New Roman" panose="02020603050405020304" pitchFamily="18" charset="0"/>
+                <a:cs typeface="Times New Roman" panose="02020603050405020304" pitchFamily="18" charset="0"/>
+              </a:rPr>
+              <a:t>objectifs selon les besoins et préférences des </a:t>
+            </a:r>
+            <a:r>
+              <a:rPr lang="fr-FR" sz="2800" dirty="0" smtClean="0">
+                <a:latin typeface="Times New Roman" panose="02020603050405020304" pitchFamily="18" charset="0"/>
+                <a:cs typeface="Times New Roman" panose="02020603050405020304" pitchFamily="18" charset="0"/>
+              </a:rPr>
+              <a:t>auditeurs :</a:t>
+            </a:r>
+            <a:endParaRPr lang="fr-FR" sz="2800" dirty="0">
+              <a:latin typeface="Times New Roman" panose="02020603050405020304" pitchFamily="18" charset="0"/>
+              <a:cs typeface="Times New Roman" panose="02020603050405020304" pitchFamily="18" charset="0"/>
+            </a:endParaRPr>
+          </a:p>
+          <a:p>
+            <a:pPr marL="0" indent="0" algn="ctr">
+              <a:buNone/>
+            </a:pPr>
+            <a:r>
+              <a:rPr lang="fr-FR" sz="2800" b="1" dirty="0" smtClean="0">
+                <a:latin typeface="Times New Roman" panose="02020603050405020304" pitchFamily="18" charset="0"/>
+                <a:cs typeface="Times New Roman" panose="02020603050405020304" pitchFamily="18" charset="0"/>
+              </a:rPr>
+              <a:t>- </a:t>
+            </a:r>
+            <a:r>
+              <a:rPr lang="fr-FR" sz="2800" b="1" dirty="0">
+                <a:latin typeface="Times New Roman" panose="02020603050405020304" pitchFamily="18" charset="0"/>
+                <a:cs typeface="Times New Roman" panose="02020603050405020304" pitchFamily="18" charset="0"/>
+              </a:rPr>
+              <a:t>Education et Apprentissage</a:t>
+            </a:r>
+            <a:r>
+              <a:rPr lang="fr-FR" sz="2800" dirty="0">
+                <a:latin typeface="Times New Roman" panose="02020603050405020304" pitchFamily="18" charset="0"/>
+                <a:cs typeface="Times New Roman" panose="02020603050405020304" pitchFamily="18" charset="0"/>
+              </a:rPr>
+              <a:t> : notre livre audio peut être utilisé comme outil d’apprentissage  pour acquérir de nouvelles connaissances sur divers sujets.  </a:t>
+            </a:r>
+          </a:p>
+          <a:p>
+            <a:pPr marL="0" indent="0" algn="ctr">
+              <a:buNone/>
+            </a:pPr>
+            <a:r>
+              <a:rPr lang="fr-FR" sz="2800" b="1" dirty="0">
+                <a:latin typeface="Times New Roman" panose="02020603050405020304" pitchFamily="18" charset="0"/>
+                <a:cs typeface="Times New Roman" panose="02020603050405020304" pitchFamily="18" charset="0"/>
+              </a:rPr>
+              <a:t>- Divertissement</a:t>
+            </a:r>
+            <a:r>
+              <a:rPr lang="fr-FR" sz="2800" dirty="0">
+                <a:latin typeface="Times New Roman" panose="02020603050405020304" pitchFamily="18" charset="0"/>
+                <a:cs typeface="Times New Roman" panose="02020603050405020304" pitchFamily="18" charset="0"/>
+              </a:rPr>
+              <a:t> : beaucoup de gens écoutent des livres audio pour le simple  plaisir de la narration et de l’histoire.</a:t>
+            </a:r>
+          </a:p>
+          <a:p>
+            <a:pPr marL="0" indent="0" algn="ctr">
+              <a:buNone/>
+            </a:pPr>
+            <a:r>
+              <a:rPr lang="fr-FR" sz="2800" b="1" dirty="0">
+                <a:latin typeface="Times New Roman" panose="02020603050405020304" pitchFamily="18" charset="0"/>
+                <a:cs typeface="Times New Roman" panose="02020603050405020304" pitchFamily="18" charset="0"/>
+              </a:rPr>
+              <a:t>- Accessibilité : </a:t>
+            </a:r>
+            <a:r>
+              <a:rPr lang="fr-FR" sz="2800" dirty="0">
+                <a:latin typeface="Times New Roman" panose="02020603050405020304" pitchFamily="18" charset="0"/>
+                <a:cs typeface="Times New Roman" panose="02020603050405020304" pitchFamily="18" charset="0"/>
+              </a:rPr>
+              <a:t>notre livre audio offre  une alternative aux livres imprimés pour les personnes ayant des difficultés à lire, telles que les personnes malvoyantes ou dyslexique.</a:t>
+            </a:r>
+          </a:p>
+          <a:p>
+            <a:pPr marL="0" indent="0" algn="ctr">
+              <a:buNone/>
+            </a:pPr>
+            <a:r>
+              <a:rPr lang="fr-FR" sz="2800" b="1" dirty="0">
+                <a:latin typeface="Times New Roman" panose="02020603050405020304" pitchFamily="18" charset="0"/>
+                <a:cs typeface="Times New Roman" panose="02020603050405020304" pitchFamily="18" charset="0"/>
+              </a:rPr>
+              <a:t>- Gain de temps : </a:t>
+            </a:r>
+            <a:r>
+              <a:rPr lang="fr-FR" sz="2800" dirty="0">
+                <a:latin typeface="Times New Roman" panose="02020603050405020304" pitchFamily="18" charset="0"/>
+                <a:cs typeface="Times New Roman" panose="02020603050405020304" pitchFamily="18" charset="0"/>
+              </a:rPr>
+              <a:t>pour les personnes très occupées, notre projet offre une façon pratique de consommer des livres pendant les déplacements ou les temps fort.    </a:t>
+            </a:r>
+          </a:p>
+          <a:p>
+            <a:pPr marL="0" indent="0" algn="ctr">
+              <a:buNone/>
+            </a:pPr>
+            <a:r>
+              <a:rPr lang="fr-FR" sz="2800" b="1" dirty="0">
+                <a:latin typeface="Times New Roman" panose="02020603050405020304" pitchFamily="18" charset="0"/>
+                <a:cs typeface="Times New Roman" panose="02020603050405020304" pitchFamily="18" charset="0"/>
+              </a:rPr>
+              <a:t>- Multitâche : </a:t>
+            </a:r>
+            <a:r>
+              <a:rPr lang="fr-FR" sz="2800" dirty="0">
+                <a:latin typeface="Times New Roman" panose="02020603050405020304" pitchFamily="18" charset="0"/>
+                <a:cs typeface="Times New Roman" panose="02020603050405020304" pitchFamily="18" charset="0"/>
+              </a:rPr>
+              <a:t>il permet aux lecteurs de consommer du contenu tout en effectuant d’autres activités comme faire du sport ou de la cuisine.</a:t>
+            </a:r>
+          </a:p>
+          <a:p>
+            <a:pPr marL="0" indent="0">
+              <a:buNone/>
+            </a:pPr>
+            <a:endParaRPr lang="fr-FR" sz="2800" dirty="0">
+              <a:latin typeface="Times New Roman" panose="02020603050405020304" pitchFamily="18" charset="0"/>
+              <a:cs typeface="Times New Roman" panose="02020603050405020304" pitchFamily="18" charset="0"/>
+            </a:endParaRPr>
+          </a:p>
+          <a:p>
+            <a:pPr marL="0" indent="0">
+              <a:buNone/>
+            </a:pPr>
+            <a:endParaRPr lang="fr-FR" dirty="0"/>
+          </a:p>
+        </p:txBody>
+      </p:sp>
     </p:spTree>
     <p:extLst>
       <p:ext uri="{BB962C8B-B14F-4D97-AF65-F5344CB8AC3E}">
-        <p14:creationId xmlns:p14="http://schemas.microsoft.com/office/powerpoint/2010/main" val="986600075"/>
+        <p14:creationId xmlns:p14="http://schemas.microsoft.com/office/powerpoint/2010/main" val="3685270537"/>
       </p:ext>
     </p:extLst>
   </p:cSld>
@@ -6898,200 +8077,156 @@
             <p:ph type="title"/>
           </p:nvPr>
         </p:nvSpPr>
-        <p:spPr/>
+        <p:spPr>
+          <a:xfrm>
+            <a:off x="646111" y="195140"/>
+            <a:ext cx="9404723" cy="1400530"/>
+          </a:xfrm>
+        </p:spPr>
         <p:txBody>
           <a:bodyPr/>
           <a:lstStyle/>
           <a:p>
             <a:pPr algn="ctr"/>
             <a:r>
-              <a:rPr lang="fr-FR" b="1" u="sng" dirty="0" smtClean="0">
-                <a:latin typeface="Times New Roman" panose="02020603050405020304" pitchFamily="18" charset="0"/>
-                <a:cs typeface="Times New Roman" panose="02020603050405020304" pitchFamily="18" charset="0"/>
-              </a:rPr>
-              <a:t>Présentation de l’application</a:t>
-            </a:r>
-            <a:endParaRPr lang="fr-FR" b="1" u="sng" dirty="0">
-              <a:latin typeface="Times New Roman" panose="02020603050405020304" pitchFamily="18" charset="0"/>
-              <a:cs typeface="Times New Roman" panose="02020603050405020304" pitchFamily="18" charset="0"/>
-            </a:endParaRPr>
-          </a:p>
-        </p:txBody>
-      </p:sp>
-      <p:sp>
-        <p:nvSpPr>
-          <p:cNvPr id="3" name="Espace réservé du contenu 2"/>
-          <p:cNvSpPr>
-            <a:spLocks noGrp="1"/>
-          </p:cNvSpPr>
+              <a:rPr lang="fr-FR" dirty="0"/>
+              <a:t> </a:t>
+            </a:r>
+            <a:r>
+              <a:rPr lang="fr-FR" dirty="0" smtClean="0"/>
+              <a:t> </a:t>
+            </a:r>
+            <a:r>
+              <a:rPr lang="fr-FR" b="1" u="sng" dirty="0" smtClean="0"/>
+              <a:t>Design et Interface utilisateur (UI/UX)</a:t>
+            </a:r>
+            <a:endParaRPr lang="fr-FR" b="1" u="sng" dirty="0"/>
+          </a:p>
+        </p:txBody>
+      </p:sp>
+      <p:pic>
+        <p:nvPicPr>
+          <p:cNvPr id="5" name="Espace réservé du contenu 4"/>
+          <p:cNvPicPr>
+            <a:picLocks noGrp="1" noChangeAspect="1"/>
+          </p:cNvPicPr>
           <p:nvPr>
             <p:ph idx="1"/>
           </p:nvPr>
-        </p:nvSpPr>
-        <p:spPr>
-          <a:xfrm>
-            <a:off x="646112" y="1577341"/>
-            <a:ext cx="9860942" cy="5146636"/>
-          </a:xfrm>
-        </p:spPr>
-        <p:txBody>
-          <a:bodyPr>
-            <a:normAutofit fontScale="85000" lnSpcReduction="20000"/>
-          </a:bodyPr>
-          <a:lstStyle/>
-          <a:p>
-            <a:pPr marL="0" indent="0" algn="ctr">
-              <a:buNone/>
-            </a:pPr>
-            <a:r>
-              <a:rPr lang="fr-FR" sz="2800" dirty="0" smtClean="0">
-                <a:latin typeface="Times New Roman" panose="02020603050405020304" pitchFamily="18" charset="0"/>
-                <a:cs typeface="Times New Roman" panose="02020603050405020304" pitchFamily="18" charset="0"/>
-              </a:rPr>
-              <a:t>Notre application peut avoir divers </a:t>
-            </a:r>
-            <a:r>
-              <a:rPr lang="fr-FR" sz="2800" dirty="0">
-                <a:latin typeface="Times New Roman" panose="02020603050405020304" pitchFamily="18" charset="0"/>
-                <a:cs typeface="Times New Roman" panose="02020603050405020304" pitchFamily="18" charset="0"/>
-              </a:rPr>
-              <a:t>objectifs selon les besoins et préférences des </a:t>
-            </a:r>
-            <a:r>
-              <a:rPr lang="fr-FR" sz="2800" dirty="0" smtClean="0">
-                <a:latin typeface="Times New Roman" panose="02020603050405020304" pitchFamily="18" charset="0"/>
-                <a:cs typeface="Times New Roman" panose="02020603050405020304" pitchFamily="18" charset="0"/>
-              </a:rPr>
-              <a:t>auditeurs :</a:t>
-            </a:r>
-            <a:endParaRPr lang="fr-FR" sz="2800" dirty="0">
-              <a:latin typeface="Times New Roman" panose="02020603050405020304" pitchFamily="18" charset="0"/>
-              <a:cs typeface="Times New Roman" panose="02020603050405020304" pitchFamily="18" charset="0"/>
-            </a:endParaRPr>
-          </a:p>
-          <a:p>
-            <a:pPr marL="0" indent="0" algn="ctr">
-              <a:buNone/>
-            </a:pPr>
-            <a:r>
-              <a:rPr lang="fr-FR" sz="2800" b="1" dirty="0" smtClean="0">
-                <a:latin typeface="Times New Roman" panose="02020603050405020304" pitchFamily="18" charset="0"/>
-                <a:cs typeface="Times New Roman" panose="02020603050405020304" pitchFamily="18" charset="0"/>
-              </a:rPr>
-              <a:t>- </a:t>
-            </a:r>
-            <a:r>
-              <a:rPr lang="fr-FR" sz="2800" b="1" dirty="0">
-                <a:latin typeface="Times New Roman" panose="02020603050405020304" pitchFamily="18" charset="0"/>
-                <a:cs typeface="Times New Roman" panose="02020603050405020304" pitchFamily="18" charset="0"/>
-              </a:rPr>
-              <a:t>Education et Apprentissage</a:t>
-            </a:r>
-            <a:r>
-              <a:rPr lang="fr-FR" sz="2800" dirty="0">
-                <a:latin typeface="Times New Roman" panose="02020603050405020304" pitchFamily="18" charset="0"/>
-                <a:cs typeface="Times New Roman" panose="02020603050405020304" pitchFamily="18" charset="0"/>
-              </a:rPr>
-              <a:t> : notre livre audio peut être utilisé comme outil d’apprentissage  pour acquérir de nouvelles connaissances sur divers sujets.  </a:t>
-            </a:r>
-          </a:p>
-          <a:p>
-            <a:pPr marL="0" indent="0" algn="ctr">
-              <a:buNone/>
-            </a:pPr>
-            <a:r>
-              <a:rPr lang="fr-FR" sz="2800" b="1" dirty="0">
-                <a:latin typeface="Times New Roman" panose="02020603050405020304" pitchFamily="18" charset="0"/>
-                <a:cs typeface="Times New Roman" panose="02020603050405020304" pitchFamily="18" charset="0"/>
-              </a:rPr>
-              <a:t>- Divertissement</a:t>
-            </a:r>
-            <a:r>
-              <a:rPr lang="fr-FR" sz="2800" dirty="0">
-                <a:latin typeface="Times New Roman" panose="02020603050405020304" pitchFamily="18" charset="0"/>
-                <a:cs typeface="Times New Roman" panose="02020603050405020304" pitchFamily="18" charset="0"/>
-              </a:rPr>
-              <a:t> : beaucoup de gens écoutent des livres audio pour le simple  plaisir de la narration et de l’histoire.</a:t>
-            </a:r>
-          </a:p>
-          <a:p>
-            <a:pPr marL="0" indent="0" algn="ctr">
-              <a:buNone/>
-            </a:pPr>
-            <a:r>
-              <a:rPr lang="fr-FR" sz="2800" b="1" dirty="0">
-                <a:latin typeface="Times New Roman" panose="02020603050405020304" pitchFamily="18" charset="0"/>
-                <a:cs typeface="Times New Roman" panose="02020603050405020304" pitchFamily="18" charset="0"/>
-              </a:rPr>
-              <a:t>- Accessibilité : </a:t>
-            </a:r>
-            <a:r>
-              <a:rPr lang="fr-FR" sz="2800" dirty="0">
-                <a:latin typeface="Times New Roman" panose="02020603050405020304" pitchFamily="18" charset="0"/>
-                <a:cs typeface="Times New Roman" panose="02020603050405020304" pitchFamily="18" charset="0"/>
-              </a:rPr>
-              <a:t>notre livre audio offre  une alternative aux livres imprimés pour les personnes ayant des difficultés à lire, telles que les personnes malvoyantes ou dyslexique.</a:t>
-            </a:r>
-          </a:p>
-          <a:p>
-            <a:pPr marL="0" indent="0" algn="ctr">
-              <a:buNone/>
-            </a:pPr>
-            <a:r>
-              <a:rPr lang="fr-FR" sz="2800" b="1" dirty="0">
-                <a:latin typeface="Times New Roman" panose="02020603050405020304" pitchFamily="18" charset="0"/>
-                <a:cs typeface="Times New Roman" panose="02020603050405020304" pitchFamily="18" charset="0"/>
-              </a:rPr>
-              <a:t>- Gain de temps : </a:t>
-            </a:r>
-            <a:r>
-              <a:rPr lang="fr-FR" sz="2800" dirty="0">
-                <a:latin typeface="Times New Roman" panose="02020603050405020304" pitchFamily="18" charset="0"/>
-                <a:cs typeface="Times New Roman" panose="02020603050405020304" pitchFamily="18" charset="0"/>
-              </a:rPr>
-              <a:t>pour les personnes très occupées, notre projet offre une façon pratique de consommer des livres pendant les déplacements ou les temps fort.    </a:t>
-            </a:r>
-          </a:p>
-          <a:p>
-            <a:pPr marL="0" indent="0" algn="ctr">
-              <a:buNone/>
-            </a:pPr>
-            <a:r>
-              <a:rPr lang="fr-FR" sz="2800" b="1" dirty="0">
-                <a:latin typeface="Times New Roman" panose="02020603050405020304" pitchFamily="18" charset="0"/>
-                <a:cs typeface="Times New Roman" panose="02020603050405020304" pitchFamily="18" charset="0"/>
-              </a:rPr>
-              <a:t>- Multitâche : </a:t>
-            </a:r>
-            <a:r>
-              <a:rPr lang="fr-FR" sz="2800" dirty="0">
-                <a:latin typeface="Times New Roman" panose="02020603050405020304" pitchFamily="18" charset="0"/>
-                <a:cs typeface="Times New Roman" panose="02020603050405020304" pitchFamily="18" charset="0"/>
-              </a:rPr>
-              <a:t>il permet aux lecteurs de consommer du contenu tout en effectuant d’autres activités comme faire du sport ou de la cuisine.</a:t>
-            </a:r>
-          </a:p>
-          <a:p>
-            <a:pPr marL="0" indent="0">
-              <a:buNone/>
-            </a:pPr>
-            <a:endParaRPr lang="fr-FR" sz="2800" dirty="0">
-              <a:latin typeface="Times New Roman" panose="02020603050405020304" pitchFamily="18" charset="0"/>
-              <a:cs typeface="Times New Roman" panose="02020603050405020304" pitchFamily="18" charset="0"/>
-            </a:endParaRPr>
-          </a:p>
-          <a:p>
-            <a:pPr marL="0" indent="0">
-              <a:buNone/>
-            </a:pPr>
-            <a:endParaRPr lang="fr-FR" dirty="0"/>
-          </a:p>
-        </p:txBody>
-      </p:sp>
+        </p:nvPicPr>
+        <p:blipFill>
+          <a:blip r:embed="rId2">
+            <a:extLst>
+              <a:ext uri="{28A0092B-C50C-407E-A947-70E740481C1C}">
+                <a14:useLocalDpi xmlns:a14="http://schemas.microsoft.com/office/drawing/2010/main" val="0"/>
+              </a:ext>
+            </a:extLst>
+          </a:blip>
+          <a:stretch>
+            <a:fillRect/>
+          </a:stretch>
+        </p:blipFill>
+        <p:spPr>
+          <a:xfrm>
+            <a:off x="160652" y="1816039"/>
+            <a:ext cx="2543530" cy="4067743"/>
+          </a:xfrm>
+        </p:spPr>
+      </p:pic>
+      <p:pic>
+        <p:nvPicPr>
+          <p:cNvPr id="19" name="Image 18"/>
+          <p:cNvPicPr>
+            <a:picLocks noChangeAspect="1"/>
+          </p:cNvPicPr>
+          <p:nvPr/>
+        </p:nvPicPr>
+        <p:blipFill>
+          <a:blip r:embed="rId3">
+            <a:extLst>
+              <a:ext uri="{28A0092B-C50C-407E-A947-70E740481C1C}">
+                <a14:useLocalDpi xmlns:a14="http://schemas.microsoft.com/office/drawing/2010/main" val="0"/>
+              </a:ext>
+            </a:extLst>
+          </a:blip>
+          <a:stretch>
+            <a:fillRect/>
+          </a:stretch>
+        </p:blipFill>
+        <p:spPr>
+          <a:xfrm>
+            <a:off x="9279566" y="1904587"/>
+            <a:ext cx="2418788" cy="3941986"/>
+          </a:xfrm>
+          <a:prstGeom prst="rect">
+            <a:avLst/>
+          </a:prstGeom>
+        </p:spPr>
+      </p:pic>
+      <p:pic>
+        <p:nvPicPr>
+          <p:cNvPr id="20" name="Image 19"/>
+          <p:cNvPicPr>
+            <a:picLocks noChangeAspect="1"/>
+          </p:cNvPicPr>
+          <p:nvPr/>
+        </p:nvPicPr>
+        <p:blipFill>
+          <a:blip r:embed="rId4">
+            <a:extLst>
+              <a:ext uri="{28A0092B-C50C-407E-A947-70E740481C1C}">
+                <a14:useLocalDpi xmlns:a14="http://schemas.microsoft.com/office/drawing/2010/main" val="0"/>
+              </a:ext>
+            </a:extLst>
+          </a:blip>
+          <a:stretch>
+            <a:fillRect/>
+          </a:stretch>
+        </p:blipFill>
+        <p:spPr>
+          <a:xfrm>
+            <a:off x="6253201" y="1904587"/>
+            <a:ext cx="2555948" cy="3941986"/>
+          </a:xfrm>
+          <a:prstGeom prst="rect">
+            <a:avLst/>
+          </a:prstGeom>
+        </p:spPr>
+      </p:pic>
+      <p:pic>
+        <p:nvPicPr>
+          <p:cNvPr id="21" name="Image 20"/>
+          <p:cNvPicPr>
+            <a:picLocks noChangeAspect="1"/>
+          </p:cNvPicPr>
+          <p:nvPr/>
+        </p:nvPicPr>
+        <p:blipFill>
+          <a:blip r:embed="rId5">
+            <a:extLst>
+              <a:ext uri="{28A0092B-C50C-407E-A947-70E740481C1C}">
+                <a14:useLocalDpi xmlns:a14="http://schemas.microsoft.com/office/drawing/2010/main" val="0"/>
+              </a:ext>
+            </a:extLst>
+          </a:blip>
+          <a:stretch>
+            <a:fillRect/>
+          </a:stretch>
+        </p:blipFill>
+        <p:spPr>
+          <a:xfrm>
+            <a:off x="3174598" y="1890457"/>
+            <a:ext cx="2608186" cy="3956116"/>
+          </a:xfrm>
+          <a:prstGeom prst="rect">
+            <a:avLst/>
+          </a:prstGeom>
+        </p:spPr>
+      </p:pic>
     </p:spTree>
     <p:extLst>
       <p:ext uri="{BB962C8B-B14F-4D97-AF65-F5344CB8AC3E}">
-        <p14:creationId xmlns:p14="http://schemas.microsoft.com/office/powerpoint/2010/main" val="3685270537"/>
+        <p14:creationId xmlns:p14="http://schemas.microsoft.com/office/powerpoint/2010/main" val="986600075"/>
       </p:ext>
     </p:extLst>
   </p:cSld>
@@ -7871,15 +9006,7 @@
             <a:pPr algn="ctr"/>
             <a:r>
               <a:rPr lang="fr-FR" sz="1400" dirty="0" smtClean="0"/>
-              <a:t>Implémentation de carrousel(</a:t>
-            </a:r>
-            <a:r>
-              <a:rPr lang="fr-FR" sz="1400" dirty="0" smtClean="0"/>
-              <a:t>slider</a:t>
-            </a:r>
-            <a:r>
-              <a:rPr lang="fr-FR" sz="1400" dirty="0" smtClean="0"/>
-              <a:t>)</a:t>
+              <a:t>Implémentation de carrousel(slider)</a:t>
             </a:r>
             <a:endParaRPr lang="fr-FR" sz="1400" dirty="0"/>
           </a:p>
@@ -7976,13 +9103,8 @@
             </a:pPr>
             <a:r>
               <a:rPr lang="fr-FR" dirty="0" smtClean="0"/>
-              <a:t>Plateforme de développement: </a:t>
-            </a:r>
-            <a:r>
-              <a:rPr lang="fr-FR" dirty="0" smtClean="0"/>
-              <a:t>Ionic</a:t>
-            </a:r>
-            <a:endParaRPr lang="fr-FR" dirty="0" smtClean="0"/>
+              <a:t>Plateforme de développement: Ionic</a:t>
+            </a:r>
           </a:p>
           <a:p>
             <a:pPr>
@@ -7991,21 +9113,8 @@
             </a:pPr>
             <a:r>
               <a:rPr lang="fr-FR" dirty="0" smtClean="0"/>
-              <a:t>Langages de programmation : </a:t>
-            </a:r>
-            <a:r>
-              <a:rPr lang="fr-FR" dirty="0" smtClean="0"/>
-              <a:t>Angular</a:t>
-            </a:r>
-            <a:r>
-              <a:rPr lang="fr-FR" dirty="0" smtClean="0"/>
-              <a:t> , SCSS, </a:t>
-            </a:r>
-            <a:r>
-              <a:rPr lang="fr-FR" dirty="0" smtClean="0"/>
-              <a:t>Typescript</a:t>
-            </a:r>
-            <a:endParaRPr lang="fr-FR" dirty="0" smtClean="0"/>
+              <a:t>Langages de programmation : Angular , SCSS, Typescript</a:t>
+            </a:r>
           </a:p>
           <a:p>
             <a:pPr>
@@ -8018,11 +9127,7 @@
             </a:r>
             <a:r>
               <a:rPr lang="fr-FR" dirty="0" smtClean="0"/>
-              <a:t>estion de base de données : Services, données </a:t>
-            </a:r>
-            <a:r>
-              <a:rPr lang="fr-FR" dirty="0" smtClean="0"/>
-              <a:t>json</a:t>
+              <a:t>estion de base de données : Services, données json</a:t>
             </a:r>
             <a:endParaRPr lang="fr-FR" dirty="0"/>
           </a:p>
@@ -8196,7 +9301,12 @@
             <p:ph type="title"/>
           </p:nvPr>
         </p:nvSpPr>
-        <p:spPr/>
+        <p:spPr>
+          <a:xfrm>
+            <a:off x="646111" y="452719"/>
+            <a:ext cx="9404723" cy="757896"/>
+          </a:xfrm>
+        </p:spPr>
         <p:txBody>
           <a:bodyPr/>
           <a:lstStyle/>
@@ -8206,13 +9316,31 @@
               <a:rPr lang="fr-FR" dirty="0" smtClean="0"/>
               <a:t>Partie Back-end</a:t>
             </a:r>
-            <a:endParaRPr lang="fr-FR" dirty="0"/>
+            <a:br>
+              <a:rPr lang="fr-FR" dirty="0" smtClean="0"/>
+            </a:br>
+            <a:r>
+              <a:rPr lang="fr-FR" dirty="0" smtClean="0"/>
+              <a:t/>
+            </a:r>
+            <a:br>
+              <a:rPr lang="fr-FR" dirty="0" smtClean="0"/>
+            </a:br>
+            <a:r>
+              <a:rPr lang="fr-FR" sz="2400" dirty="0" smtClean="0"/>
+              <a:t>page </a:t>
+            </a:r>
+            <a:r>
+              <a:rPr lang="fr-FR" sz="2400" dirty="0" err="1" smtClean="0"/>
+              <a:t>app-routing.module.ts</a:t>
+            </a:r>
+            <a:endParaRPr lang="fr-FR" sz="2400" dirty="0"/>
           </a:p>
         </p:txBody>
       </p:sp>
       <p:pic>
         <p:nvPicPr>
-          <p:cNvPr id="4" name="Espace réservé du contenu 3"/>
+          <p:cNvPr id="8" name="Espace réservé du contenu 7"/>
           <p:cNvPicPr>
             <a:picLocks noGrp="1" noChangeAspect="1"/>
           </p:cNvPicPr>
@@ -8234,8 +9362,8 @@
         </p:blipFill>
         <p:spPr>
           <a:xfrm>
-            <a:off x="1140820" y="1580096"/>
-            <a:ext cx="8415304" cy="4910856"/>
+            <a:off x="1872531" y="2402514"/>
+            <a:ext cx="7462137" cy="4139953"/>
           </a:xfrm>
         </p:spPr>
       </p:pic>

</xml_diff>